<commit_message>
graphics tweaks wrt logo
</commit_message>
<xml_diff>
--- a/docs/content/media/powerpoint/Overview.pptx
+++ b/docs/content/media/powerpoint/Overview.pptx
@@ -288,7 +288,7 @@
           <a:p>
             <a:fld id="{9BE3F6F5-7867-F041-91C0-3CE7BFD0C93A}" type="datetimeFigureOut">
               <a:rPr lang="en-US" smtClean="0"/>
-              <a:t>3/13/17</a:t>
+              <a:t>6/7/17</a:t>
             </a:fld>
             <a:endParaRPr lang="en-US"/>
           </a:p>
@@ -458,7 +458,7 @@
           <a:p>
             <a:fld id="{9BE3F6F5-7867-F041-91C0-3CE7BFD0C93A}" type="datetimeFigureOut">
               <a:rPr lang="en-US" smtClean="0"/>
-              <a:t>3/13/17</a:t>
+              <a:t>6/7/17</a:t>
             </a:fld>
             <a:endParaRPr lang="en-US"/>
           </a:p>
@@ -638,7 +638,7 @@
           <a:p>
             <a:fld id="{9BE3F6F5-7867-F041-91C0-3CE7BFD0C93A}" type="datetimeFigureOut">
               <a:rPr lang="en-US" smtClean="0"/>
-              <a:t>3/13/17</a:t>
+              <a:t>6/7/17</a:t>
             </a:fld>
             <a:endParaRPr lang="en-US"/>
           </a:p>
@@ -808,7 +808,7 @@
           <a:p>
             <a:fld id="{9BE3F6F5-7867-F041-91C0-3CE7BFD0C93A}" type="datetimeFigureOut">
               <a:rPr lang="en-US" smtClean="0"/>
-              <a:t>3/13/17</a:t>
+              <a:t>6/7/17</a:t>
             </a:fld>
             <a:endParaRPr lang="en-US"/>
           </a:p>
@@ -1054,7 +1054,7 @@
           <a:p>
             <a:fld id="{9BE3F6F5-7867-F041-91C0-3CE7BFD0C93A}" type="datetimeFigureOut">
               <a:rPr lang="en-US" smtClean="0"/>
-              <a:t>3/13/17</a:t>
+              <a:t>6/7/17</a:t>
             </a:fld>
             <a:endParaRPr lang="en-US"/>
           </a:p>
@@ -1342,7 +1342,7 @@
           <a:p>
             <a:fld id="{9BE3F6F5-7867-F041-91C0-3CE7BFD0C93A}" type="datetimeFigureOut">
               <a:rPr lang="en-US" smtClean="0"/>
-              <a:t>3/13/17</a:t>
+              <a:t>6/7/17</a:t>
             </a:fld>
             <a:endParaRPr lang="en-US"/>
           </a:p>
@@ -1764,7 +1764,7 @@
           <a:p>
             <a:fld id="{9BE3F6F5-7867-F041-91C0-3CE7BFD0C93A}" type="datetimeFigureOut">
               <a:rPr lang="en-US" smtClean="0"/>
-              <a:t>3/13/17</a:t>
+              <a:t>6/7/17</a:t>
             </a:fld>
             <a:endParaRPr lang="en-US"/>
           </a:p>
@@ -1882,7 +1882,7 @@
           <a:p>
             <a:fld id="{9BE3F6F5-7867-F041-91C0-3CE7BFD0C93A}" type="datetimeFigureOut">
               <a:rPr lang="en-US" smtClean="0"/>
-              <a:t>3/13/17</a:t>
+              <a:t>6/7/17</a:t>
             </a:fld>
             <a:endParaRPr lang="en-US"/>
           </a:p>
@@ -1977,7 +1977,7 @@
           <a:p>
             <a:fld id="{9BE3F6F5-7867-F041-91C0-3CE7BFD0C93A}" type="datetimeFigureOut">
               <a:rPr lang="en-US" smtClean="0"/>
-              <a:t>3/13/17</a:t>
+              <a:t>6/7/17</a:t>
             </a:fld>
             <a:endParaRPr lang="en-US"/>
           </a:p>
@@ -2254,7 +2254,7 @@
           <a:p>
             <a:fld id="{9BE3F6F5-7867-F041-91C0-3CE7BFD0C93A}" type="datetimeFigureOut">
               <a:rPr lang="en-US" smtClean="0"/>
-              <a:t>3/13/17</a:t>
+              <a:t>6/7/17</a:t>
             </a:fld>
             <a:endParaRPr lang="en-US"/>
           </a:p>
@@ -2507,7 +2507,7 @@
           <a:p>
             <a:fld id="{9BE3F6F5-7867-F041-91C0-3CE7BFD0C93A}" type="datetimeFigureOut">
               <a:rPr lang="en-US" smtClean="0"/>
-              <a:t>3/13/17</a:t>
+              <a:t>6/7/17</a:t>
             </a:fld>
             <a:endParaRPr lang="en-US"/>
           </a:p>
@@ -2720,7 +2720,7 @@
           <a:p>
             <a:fld id="{9BE3F6F5-7867-F041-91C0-3CE7BFD0C93A}" type="datetimeFigureOut">
               <a:rPr lang="en-US" smtClean="0"/>
-              <a:t>3/13/17</a:t>
+              <a:t>6/7/17</a:t>
             </a:fld>
             <a:endParaRPr lang="en-US"/>
           </a:p>
@@ -3496,48 +3496,6 @@
       </p:sp>
       <p:sp>
         <p:nvSpPr>
-          <p:cNvPr id="26" name="TextBox 25"/>
-          <p:cNvSpPr txBox="1"/>
-          <p:nvPr/>
-        </p:nvSpPr>
-        <p:spPr>
-          <a:xfrm>
-            <a:off x="3888016" y="3088629"/>
-            <a:ext cx="1796263" cy="446276"/>
-          </a:xfrm>
-          <a:prstGeom prst="rect">
-            <a:avLst/>
-          </a:prstGeom>
-          <a:noFill/>
-        </p:spPr>
-        <p:txBody>
-          <a:bodyPr wrap="square" rtlCol="0">
-            <a:spAutoFit/>
-          </a:bodyPr>
-          <a:lstStyle/>
-          <a:p>
-            <a:r>
-              <a:rPr lang="en-US" sz="2300" b="1" dirty="0" smtClean="0">
-                <a:solidFill>
-                  <a:srgbClr val="008000"/>
-                </a:solidFill>
-                <a:latin typeface="Courier New"/>
-                <a:cs typeface="Courier New"/>
-              </a:rPr>
-              <a:t>hichipper</a:t>
-            </a:r>
-            <a:endParaRPr lang="en-US" sz="2300" b="1" dirty="0">
-              <a:solidFill>
-                <a:srgbClr val="008000"/>
-              </a:solidFill>
-              <a:latin typeface="Courier New"/>
-              <a:cs typeface="Courier New"/>
-            </a:endParaRPr>
-          </a:p>
-        </p:txBody>
-      </p:sp>
-      <p:sp>
-        <p:nvSpPr>
           <p:cNvPr id="32" name="Folded Corner 31"/>
           <p:cNvSpPr/>
           <p:nvPr/>
@@ -4222,10 +4180,6 @@
               </a:rPr>
               <a:t>HiChIP</a:t>
             </a:r>
-            <a:endParaRPr lang="en-US" sz="1000" b="1" dirty="0" smtClean="0">
-              <a:latin typeface="Courier New"/>
-              <a:cs typeface="Courier New"/>
-            </a:endParaRPr>
           </a:p>
           <a:p>
             <a:pPr algn="ctr"/>
@@ -4234,14 +4188,7 @@
                 <a:latin typeface="Courier New"/>
                 <a:cs typeface="Courier New"/>
               </a:rPr>
-              <a:t>Aligned </a:t>
-            </a:r>
-            <a:r>
-              <a:rPr lang="en-US" sz="1000" b="1" dirty="0" smtClean="0">
-                <a:latin typeface="Courier New"/>
-                <a:cs typeface="Courier New"/>
-              </a:rPr>
-              <a:t>Hi-C Output</a:t>
+              <a:t>Aligned Hi-C Output</a:t>
             </a:r>
             <a:endParaRPr lang="en-US" sz="1000" b="1" dirty="0">
               <a:latin typeface="Courier New"/>
@@ -7095,13 +7042,6 @@
               </a:rPr>
               <a:t>Aware Modeling</a:t>
             </a:r>
-            <a:endParaRPr lang="en-US" sz="800" b="1" dirty="0" smtClean="0">
-              <a:solidFill>
-                <a:schemeClr val="tx2"/>
-              </a:solidFill>
-              <a:latin typeface="Courier New"/>
-              <a:cs typeface="Courier New"/>
-            </a:endParaRPr>
           </a:p>
         </p:txBody>
       </p:sp>
@@ -7780,13 +7720,6 @@
               </a:rPr>
               <a:t>Inference</a:t>
             </a:r>
-            <a:endParaRPr lang="en-US" sz="800" b="1" dirty="0" smtClean="0">
-              <a:solidFill>
-                <a:srgbClr val="000000"/>
-              </a:solidFill>
-              <a:latin typeface="Courier New"/>
-              <a:cs typeface="Courier New"/>
-            </a:endParaRPr>
           </a:p>
         </p:txBody>
       </p:sp>
@@ -7837,6 +7770,36 @@
           </a:p>
         </p:txBody>
       </p:sp>
+      <p:pic>
+        <p:nvPicPr>
+          <p:cNvPr id="3" name="Picture 2" descr="hichipper_logo.png"/>
+          <p:cNvPicPr>
+            <a:picLocks noChangeAspect="1"/>
+          </p:cNvPicPr>
+          <p:nvPr/>
+        </p:nvPicPr>
+        <p:blipFill>
+          <a:blip r:embed="rId4">
+            <a:extLst>
+              <a:ext uri="{28A0092B-C50C-407E-A947-70E740481C1C}">
+                <a14:useLocalDpi xmlns:a14="http://schemas.microsoft.com/office/drawing/2010/main" val="0"/>
+              </a:ext>
+            </a:extLst>
+          </a:blip>
+          <a:stretch>
+            <a:fillRect/>
+          </a:stretch>
+        </p:blipFill>
+        <p:spPr>
+          <a:xfrm>
+            <a:off x="3384635" y="3043173"/>
+            <a:ext cx="2720522" cy="477017"/>
+          </a:xfrm>
+          <a:prstGeom prst="rect">
+            <a:avLst/>
+          </a:prstGeom>
+        </p:spPr>
+      </p:pic>
     </p:spTree>
     <p:extLst>
       <p:ext uri="{BB962C8B-B14F-4D97-AF65-F5344CB8AC3E}">

</xml_diff>